<commit_message>
Updated table of functions (hmer 1.5.0)
</commit_message>
<xml_diff>
--- a/table_functions.pptx
+++ b/table_functions.pptx
@@ -197,7 +197,7 @@
           <a:p>
             <a:fld id="{E15636E4-74B0-4AEE-A424-3CA9BD36D0E8}" type="datetimeFigureOut">
               <a:rPr lang="en-GB" smtClean="0"/>
-              <a:t>26/10/2022</a:t>
+              <a:t>07/06/2023</a:t>
             </a:fld>
             <a:endParaRPr lang="en-GB"/>
           </a:p>
@@ -680,7 +680,7 @@
           <a:p>
             <a:fld id="{F394B0BD-9DBF-4844-B752-AC18317F6010}" type="datetimeFigureOut">
               <a:rPr lang="en-GB" smtClean="0"/>
-              <a:t>26/10/2022</a:t>
+              <a:t>07/06/2023</a:t>
             </a:fld>
             <a:endParaRPr lang="en-GB"/>
           </a:p>
@@ -850,7 +850,7 @@
           <a:p>
             <a:fld id="{F394B0BD-9DBF-4844-B752-AC18317F6010}" type="datetimeFigureOut">
               <a:rPr lang="en-GB" smtClean="0"/>
-              <a:t>26/10/2022</a:t>
+              <a:t>07/06/2023</a:t>
             </a:fld>
             <a:endParaRPr lang="en-GB"/>
           </a:p>
@@ -1030,7 +1030,7 @@
           <a:p>
             <a:fld id="{F394B0BD-9DBF-4844-B752-AC18317F6010}" type="datetimeFigureOut">
               <a:rPr lang="en-GB" smtClean="0"/>
-              <a:t>26/10/2022</a:t>
+              <a:t>07/06/2023</a:t>
             </a:fld>
             <a:endParaRPr lang="en-GB"/>
           </a:p>
@@ -1200,7 +1200,7 @@
           <a:p>
             <a:fld id="{F394B0BD-9DBF-4844-B752-AC18317F6010}" type="datetimeFigureOut">
               <a:rPr lang="en-GB" smtClean="0"/>
-              <a:t>26/10/2022</a:t>
+              <a:t>07/06/2023</a:t>
             </a:fld>
             <a:endParaRPr lang="en-GB"/>
           </a:p>
@@ -1446,7 +1446,7 @@
           <a:p>
             <a:fld id="{F394B0BD-9DBF-4844-B752-AC18317F6010}" type="datetimeFigureOut">
               <a:rPr lang="en-GB" smtClean="0"/>
-              <a:t>26/10/2022</a:t>
+              <a:t>07/06/2023</a:t>
             </a:fld>
             <a:endParaRPr lang="en-GB"/>
           </a:p>
@@ -1678,7 +1678,7 @@
           <a:p>
             <a:fld id="{F394B0BD-9DBF-4844-B752-AC18317F6010}" type="datetimeFigureOut">
               <a:rPr lang="en-GB" smtClean="0"/>
-              <a:t>26/10/2022</a:t>
+              <a:t>07/06/2023</a:t>
             </a:fld>
             <a:endParaRPr lang="en-GB"/>
           </a:p>
@@ -2045,7 +2045,7 @@
           <a:p>
             <a:fld id="{F394B0BD-9DBF-4844-B752-AC18317F6010}" type="datetimeFigureOut">
               <a:rPr lang="en-GB" smtClean="0"/>
-              <a:t>26/10/2022</a:t>
+              <a:t>07/06/2023</a:t>
             </a:fld>
             <a:endParaRPr lang="en-GB"/>
           </a:p>
@@ -2163,7 +2163,7 @@
           <a:p>
             <a:fld id="{F394B0BD-9DBF-4844-B752-AC18317F6010}" type="datetimeFigureOut">
               <a:rPr lang="en-GB" smtClean="0"/>
-              <a:t>26/10/2022</a:t>
+              <a:t>07/06/2023</a:t>
             </a:fld>
             <a:endParaRPr lang="en-GB"/>
           </a:p>
@@ -2258,7 +2258,7 @@
           <a:p>
             <a:fld id="{F394B0BD-9DBF-4844-B752-AC18317F6010}" type="datetimeFigureOut">
               <a:rPr lang="en-GB" smtClean="0"/>
-              <a:t>26/10/2022</a:t>
+              <a:t>07/06/2023</a:t>
             </a:fld>
             <a:endParaRPr lang="en-GB"/>
           </a:p>
@@ -2535,7 +2535,7 @@
           <a:p>
             <a:fld id="{F394B0BD-9DBF-4844-B752-AC18317F6010}" type="datetimeFigureOut">
               <a:rPr lang="en-GB" smtClean="0"/>
-              <a:t>26/10/2022</a:t>
+              <a:t>07/06/2023</a:t>
             </a:fld>
             <a:endParaRPr lang="en-GB"/>
           </a:p>
@@ -2792,7 +2792,7 @@
           <a:p>
             <a:fld id="{F394B0BD-9DBF-4844-B752-AC18317F6010}" type="datetimeFigureOut">
               <a:rPr lang="en-GB" smtClean="0"/>
-              <a:t>26/10/2022</a:t>
+              <a:t>07/06/2023</a:t>
             </a:fld>
             <a:endParaRPr lang="en-GB"/>
           </a:p>
@@ -3005,7 +3005,7 @@
           <a:p>
             <a:fld id="{F394B0BD-9DBF-4844-B752-AC18317F6010}" type="datetimeFigureOut">
               <a:rPr lang="en-GB" smtClean="0"/>
-              <a:t>26/10/2022</a:t>
+              <a:t>07/06/2023</a:t>
             </a:fld>
             <a:endParaRPr lang="en-GB"/>
           </a:p>
@@ -3425,7 +3425,7 @@
           <p:nvPr>
             <p:extLst>
               <p:ext uri="{D42A27DB-BD31-4B8C-83A1-F6EECF244321}">
-                <p14:modId xmlns:p14="http://schemas.microsoft.com/office/powerpoint/2010/main" val="536668507"/>
+                <p14:modId xmlns:p14="http://schemas.microsoft.com/office/powerpoint/2010/main" val="3544585079"/>
               </p:ext>
             </p:extLst>
           </p:nvPr>
@@ -4932,7 +4932,7 @@
                             <a:schemeClr val="tx1"/>
                           </a:solidFill>
                         </a:rPr>
-                        <a:t>generate_new_runs</a:t>
+                        <a:t>generate_new_design</a:t>
                       </a:r>
                     </a:p>
                     <a:p>

</xml_diff>